<commit_message>
Fixed a transition and added GitHub link
</commit_message>
<xml_diff>
--- a/The future of C#.pptx
+++ b/The future of C#.pptx
@@ -306,7 +306,7 @@
           <a:p>
             <a:fld id="{87FE2091-D384-45CF-9E2A-9C8DD433CB74}" type="datetimeFigureOut">
               <a:rPr lang="en-NZ" smtClean="0"/>
-              <a:t>14/04/2014</a:t>
+              <a:t>15/04/2014</a:t>
             </a:fld>
             <a:endParaRPr lang="en-NZ"/>
           </a:p>
@@ -476,7 +476,7 @@
           <a:p>
             <a:fld id="{87FE2091-D384-45CF-9E2A-9C8DD433CB74}" type="datetimeFigureOut">
               <a:rPr lang="en-NZ" smtClean="0"/>
-              <a:t>14/04/2014</a:t>
+              <a:t>15/04/2014</a:t>
             </a:fld>
             <a:endParaRPr lang="en-NZ"/>
           </a:p>
@@ -656,7 +656,7 @@
           <a:p>
             <a:fld id="{87FE2091-D384-45CF-9E2A-9C8DD433CB74}" type="datetimeFigureOut">
               <a:rPr lang="en-NZ" smtClean="0"/>
-              <a:t>14/04/2014</a:t>
+              <a:t>15/04/2014</a:t>
             </a:fld>
             <a:endParaRPr lang="en-NZ"/>
           </a:p>
@@ -826,7 +826,7 @@
           <a:p>
             <a:fld id="{87FE2091-D384-45CF-9E2A-9C8DD433CB74}" type="datetimeFigureOut">
               <a:rPr lang="en-NZ" smtClean="0"/>
-              <a:t>14/04/2014</a:t>
+              <a:t>15/04/2014</a:t>
             </a:fld>
             <a:endParaRPr lang="en-NZ"/>
           </a:p>
@@ -1072,7 +1072,7 @@
           <a:p>
             <a:fld id="{87FE2091-D384-45CF-9E2A-9C8DD433CB74}" type="datetimeFigureOut">
               <a:rPr lang="en-NZ" smtClean="0"/>
-              <a:t>14/04/2014</a:t>
+              <a:t>15/04/2014</a:t>
             </a:fld>
             <a:endParaRPr lang="en-NZ"/>
           </a:p>
@@ -1360,7 +1360,7 @@
           <a:p>
             <a:fld id="{87FE2091-D384-45CF-9E2A-9C8DD433CB74}" type="datetimeFigureOut">
               <a:rPr lang="en-NZ" smtClean="0"/>
-              <a:t>14/04/2014</a:t>
+              <a:t>15/04/2014</a:t>
             </a:fld>
             <a:endParaRPr lang="en-NZ"/>
           </a:p>
@@ -1782,7 +1782,7 @@
           <a:p>
             <a:fld id="{87FE2091-D384-45CF-9E2A-9C8DD433CB74}" type="datetimeFigureOut">
               <a:rPr lang="en-NZ" smtClean="0"/>
-              <a:t>14/04/2014</a:t>
+              <a:t>15/04/2014</a:t>
             </a:fld>
             <a:endParaRPr lang="en-NZ"/>
           </a:p>
@@ -1900,7 +1900,7 @@
           <a:p>
             <a:fld id="{87FE2091-D384-45CF-9E2A-9C8DD433CB74}" type="datetimeFigureOut">
               <a:rPr lang="en-NZ" smtClean="0"/>
-              <a:t>14/04/2014</a:t>
+              <a:t>15/04/2014</a:t>
             </a:fld>
             <a:endParaRPr lang="en-NZ"/>
           </a:p>
@@ -1995,7 +1995,7 @@
           <a:p>
             <a:fld id="{87FE2091-D384-45CF-9E2A-9C8DD433CB74}" type="datetimeFigureOut">
               <a:rPr lang="en-NZ" smtClean="0"/>
-              <a:t>14/04/2014</a:t>
+              <a:t>15/04/2014</a:t>
             </a:fld>
             <a:endParaRPr lang="en-NZ"/>
           </a:p>
@@ -2272,7 +2272,7 @@
           <a:p>
             <a:fld id="{87FE2091-D384-45CF-9E2A-9C8DD433CB74}" type="datetimeFigureOut">
               <a:rPr lang="en-NZ" smtClean="0"/>
-              <a:t>14/04/2014</a:t>
+              <a:t>15/04/2014</a:t>
             </a:fld>
             <a:endParaRPr lang="en-NZ"/>
           </a:p>
@@ -2525,7 +2525,7 @@
           <a:p>
             <a:fld id="{87FE2091-D384-45CF-9E2A-9C8DD433CB74}" type="datetimeFigureOut">
               <a:rPr lang="en-NZ" smtClean="0"/>
-              <a:t>14/04/2014</a:t>
+              <a:t>15/04/2014</a:t>
             </a:fld>
             <a:endParaRPr lang="en-NZ"/>
           </a:p>
@@ -2738,7 +2738,7 @@
           <a:p>
             <a:fld id="{87FE2091-D384-45CF-9E2A-9C8DD433CB74}" type="datetimeFigureOut">
               <a:rPr lang="en-NZ" smtClean="0"/>
-              <a:t>14/04/2014</a:t>
+              <a:t>15/04/2014</a:t>
             </a:fld>
             <a:endParaRPr lang="en-NZ"/>
           </a:p>
@@ -3279,13 +3279,13 @@
   <p:clrMapOvr>
     <a:masterClrMapping/>
   </p:clrMapOvr>
-  <mc:AlternateContent xmlns:mc="http://schemas.openxmlformats.org/markup-compatibility/2006">
-    <mc:Choice xmlns:p14="http://schemas.microsoft.com/office/powerpoint/2010/main" Requires="p14">
+  <mc:AlternateContent xmlns:mc="http://schemas.openxmlformats.org/markup-compatibility/2006" xmlns:p14="http://schemas.microsoft.com/office/powerpoint/2010/main">
+    <mc:Choice Requires="p14">
       <p:transition spd="med" p14:dur="700">
         <p:fade/>
       </p:transition>
     </mc:Choice>
-    <mc:Fallback>
+    <mc:Fallback xmlns="">
       <p:transition spd="med">
         <p:fade/>
       </p:transition>
@@ -3386,13 +3386,13 @@
   <p:clrMapOvr>
     <a:masterClrMapping/>
   </p:clrMapOvr>
-  <mc:AlternateContent xmlns:mc="http://schemas.openxmlformats.org/markup-compatibility/2006">
-    <mc:Choice xmlns:p14="http://schemas.microsoft.com/office/powerpoint/2010/main" Requires="p14">
+  <mc:AlternateContent xmlns:mc="http://schemas.openxmlformats.org/markup-compatibility/2006" xmlns:p14="http://schemas.microsoft.com/office/powerpoint/2010/main">
+    <mc:Choice Requires="p14">
       <p:transition spd="med" p14:dur="700">
         <p:fade/>
       </p:transition>
     </mc:Choice>
-    <mc:Fallback>
+    <mc:Fallback xmlns="">
       <p:transition spd="med">
         <p:fade/>
       </p:transition>
@@ -3493,13 +3493,13 @@
   <p:clrMapOvr>
     <a:masterClrMapping/>
   </p:clrMapOvr>
-  <mc:AlternateContent xmlns:mc="http://schemas.openxmlformats.org/markup-compatibility/2006">
-    <mc:Choice xmlns:p14="http://schemas.microsoft.com/office/powerpoint/2010/main" Requires="p14">
+  <mc:AlternateContent xmlns:mc="http://schemas.openxmlformats.org/markup-compatibility/2006" xmlns:p14="http://schemas.microsoft.com/office/powerpoint/2010/main">
+    <mc:Choice Requires="p14">
       <p:transition spd="med" p14:dur="700">
         <p:fade/>
       </p:transition>
     </mc:Choice>
-    <mc:Fallback>
+    <mc:Fallback xmlns="">
       <p:transition spd="med">
         <p:fade/>
       </p:transition>
@@ -3600,13 +3600,13 @@
   <p:clrMapOvr>
     <a:masterClrMapping/>
   </p:clrMapOvr>
-  <mc:AlternateContent xmlns:mc="http://schemas.openxmlformats.org/markup-compatibility/2006">
-    <mc:Choice xmlns:p14="http://schemas.microsoft.com/office/powerpoint/2010/main" Requires="p14">
+  <mc:AlternateContent xmlns:mc="http://schemas.openxmlformats.org/markup-compatibility/2006" xmlns:p14="http://schemas.microsoft.com/office/powerpoint/2010/main">
+    <mc:Choice Requires="p14">
       <p:transition spd="med" p14:dur="700">
         <p:fade/>
       </p:transition>
     </mc:Choice>
-    <mc:Fallback>
+    <mc:Fallback xmlns="">
       <p:transition spd="med">
         <p:fade/>
       </p:transition>
@@ -3707,13 +3707,13 @@
   <p:clrMapOvr>
     <a:masterClrMapping/>
   </p:clrMapOvr>
-  <mc:AlternateContent xmlns:mc="http://schemas.openxmlformats.org/markup-compatibility/2006">
-    <mc:Choice xmlns:p14="http://schemas.microsoft.com/office/powerpoint/2010/main" Requires="p14">
+  <mc:AlternateContent xmlns:mc="http://schemas.openxmlformats.org/markup-compatibility/2006" xmlns:p14="http://schemas.microsoft.com/office/powerpoint/2010/main">
+    <mc:Choice Requires="p14">
       <p:transition spd="med" p14:dur="700">
         <p:fade/>
       </p:transition>
     </mc:Choice>
-    <mc:Fallback>
+    <mc:Fallback xmlns="">
       <p:transition spd="med">
         <p:fade/>
       </p:transition>
@@ -3814,13 +3814,13 @@
   <p:clrMapOvr>
     <a:masterClrMapping/>
   </p:clrMapOvr>
-  <mc:AlternateContent xmlns:mc="http://schemas.openxmlformats.org/markup-compatibility/2006">
-    <mc:Choice xmlns:p14="http://schemas.microsoft.com/office/powerpoint/2010/main" Requires="p14">
+  <mc:AlternateContent xmlns:mc="http://schemas.openxmlformats.org/markup-compatibility/2006" xmlns:p14="http://schemas.microsoft.com/office/powerpoint/2010/main">
+    <mc:Choice Requires="p14">
       <p:transition spd="med" p14:dur="700">
         <p:fade/>
       </p:transition>
     </mc:Choice>
-    <mc:Fallback>
+    <mc:Fallback xmlns="">
       <p:transition spd="med">
         <p:fade/>
       </p:transition>
@@ -3921,13 +3921,13 @@
   <p:clrMapOvr>
     <a:masterClrMapping/>
   </p:clrMapOvr>
-  <mc:AlternateContent xmlns:mc="http://schemas.openxmlformats.org/markup-compatibility/2006">
-    <mc:Choice xmlns:p14="http://schemas.microsoft.com/office/powerpoint/2010/main" Requires="p14">
+  <mc:AlternateContent xmlns:mc="http://schemas.openxmlformats.org/markup-compatibility/2006" xmlns:p14="http://schemas.microsoft.com/office/powerpoint/2010/main">
+    <mc:Choice Requires="p14">
       <p:transition spd="med" p14:dur="700">
         <p:fade/>
       </p:transition>
     </mc:Choice>
-    <mc:Fallback>
+    <mc:Fallback xmlns="">
       <p:transition spd="med">
         <p:fade/>
       </p:transition>
@@ -4025,13 +4025,13 @@
   <p:clrMapOvr>
     <a:masterClrMapping/>
   </p:clrMapOvr>
-  <mc:AlternateContent xmlns:mc="http://schemas.openxmlformats.org/markup-compatibility/2006">
-    <mc:Choice xmlns:p14="http://schemas.microsoft.com/office/powerpoint/2010/main" Requires="p14">
+  <mc:AlternateContent xmlns:mc="http://schemas.openxmlformats.org/markup-compatibility/2006" xmlns:p14="http://schemas.microsoft.com/office/powerpoint/2010/main">
+    <mc:Choice Requires="p14">
       <p:transition spd="med" p14:dur="700">
         <p:fade/>
       </p:transition>
     </mc:Choice>
-    <mc:Fallback>
+    <mc:Fallback xmlns="">
       <p:transition spd="med">
         <p:fade/>
       </p:transition>
@@ -4135,13 +4135,13 @@
   <p:clrMapOvr>
     <a:masterClrMapping/>
   </p:clrMapOvr>
-  <mc:AlternateContent xmlns:mc="http://schemas.openxmlformats.org/markup-compatibility/2006">
-    <mc:Choice xmlns:p14="http://schemas.microsoft.com/office/powerpoint/2010/main" Requires="p14">
+  <mc:AlternateContent xmlns:mc="http://schemas.openxmlformats.org/markup-compatibility/2006" xmlns:p14="http://schemas.microsoft.com/office/powerpoint/2010/main">
+    <mc:Choice Requires="p14">
       <p:transition spd="med" p14:dur="700">
         <p:fade/>
       </p:transition>
     </mc:Choice>
-    <mc:Fallback>
+    <mc:Fallback xmlns="">
       <p:transition spd="med">
         <p:fade/>
       </p:transition>
@@ -4243,8 +4243,8 @@
         </p:nvSpPr>
         <p:spPr>
           <a:xfrm>
-            <a:off x="4788024" y="6021288"/>
-            <a:ext cx="4032448" cy="646331"/>
+            <a:off x="4067944" y="5746030"/>
+            <a:ext cx="4896544" cy="923330"/>
           </a:xfrm>
           <a:prstGeom prst="rect">
             <a:avLst/>
@@ -4259,10 +4259,31 @@
           <a:p>
             <a:pPr algn="r"/>
             <a:r>
+              <a:rPr lang="en-NZ" dirty="0">
+                <a:hlinkClick r:id="rId2"/>
+              </a:rPr>
+              <a:t>https://github.com/itowlson/future-of-csharp</a:t>
+            </a:r>
+            <a:r>
               <a:rPr lang="en-NZ" dirty="0" smtClean="0">
                 <a:hlinkClick r:id="rId2"/>
               </a:rPr>
-              <a:t>http://developer.greenbutton.com</a:t>
+              <a:t>/</a:t>
+            </a:r>
+          </a:p>
+          <a:p>
+            <a:pPr algn="r"/>
+            <a:r>
+              <a:rPr lang="en-NZ" dirty="0" smtClean="0">
+                <a:hlinkClick r:id="rId2"/>
+              </a:rPr>
+              <a:t>http</a:t>
+            </a:r>
+            <a:r>
+              <a:rPr lang="en-NZ" dirty="0" smtClean="0">
+                <a:hlinkClick r:id="rId2"/>
+              </a:rPr>
+              <a:t>://developer.greenbutton.com</a:t>
             </a:r>
             <a:endParaRPr lang="en-NZ" dirty="0" smtClean="0"/>
           </a:p>
@@ -4329,6 +4350,18 @@
   <p:clrMapOvr>
     <a:masterClrMapping/>
   </p:clrMapOvr>
+  <mc:AlternateContent xmlns:mc="http://schemas.openxmlformats.org/markup-compatibility/2006">
+    <mc:Choice xmlns:p14="http://schemas.microsoft.com/office/powerpoint/2010/main" Requires="p14">
+      <p:transition spd="med" p14:dur="700">
+        <p:fade/>
+      </p:transition>
+    </mc:Choice>
+    <mc:Fallback>
+      <p:transition spd="med">
+        <p:fade/>
+      </p:transition>
+    </mc:Fallback>
+  </mc:AlternateContent>
   <p:timing>
     <p:tnLst>
       <p:par>
@@ -4391,13 +4424,13 @@
   <p:clrMapOvr>
     <a:masterClrMapping/>
   </p:clrMapOvr>
-  <mc:AlternateContent xmlns:mc="http://schemas.openxmlformats.org/markup-compatibility/2006">
-    <mc:Choice xmlns:p14="http://schemas.microsoft.com/office/powerpoint/2010/main" Requires="p14">
+  <mc:AlternateContent xmlns:mc="http://schemas.openxmlformats.org/markup-compatibility/2006" xmlns:p14="http://schemas.microsoft.com/office/powerpoint/2010/main">
+    <mc:Choice Requires="p14">
       <p:transition spd="med" p14:dur="700">
         <p:fade/>
       </p:transition>
     </mc:Choice>
-    <mc:Fallback>
+    <mc:Fallback xmlns="">
       <p:transition spd="med">
         <p:fade/>
       </p:transition>
@@ -4494,13 +4527,13 @@
   <p:clrMapOvr>
     <a:masterClrMapping/>
   </p:clrMapOvr>
-  <mc:AlternateContent xmlns:mc="http://schemas.openxmlformats.org/markup-compatibility/2006">
-    <mc:Choice xmlns:p14="http://schemas.microsoft.com/office/powerpoint/2010/main" Requires="p14">
+  <mc:AlternateContent xmlns:mc="http://schemas.openxmlformats.org/markup-compatibility/2006" xmlns:p14="http://schemas.microsoft.com/office/powerpoint/2010/main">
+    <mc:Choice Requires="p14">
       <p:transition spd="med" p14:dur="700">
         <p:fade/>
       </p:transition>
     </mc:Choice>
-    <mc:Fallback>
+    <mc:Fallback xmlns="">
       <p:transition spd="med">
         <p:fade/>
       </p:transition>
@@ -4607,13 +4640,13 @@
   <p:clrMapOvr>
     <a:masterClrMapping/>
   </p:clrMapOvr>
-  <mc:AlternateContent xmlns:mc="http://schemas.openxmlformats.org/markup-compatibility/2006">
-    <mc:Choice xmlns:p14="http://schemas.microsoft.com/office/powerpoint/2010/main" Requires="p14">
+  <mc:AlternateContent xmlns:mc="http://schemas.openxmlformats.org/markup-compatibility/2006" xmlns:p14="http://schemas.microsoft.com/office/powerpoint/2010/main">
+    <mc:Choice Requires="p14">
       <p:transition spd="slow" p14:dur="800">
         <p14:flythrough/>
       </p:transition>
     </mc:Choice>
-    <mc:Fallback>
+    <mc:Fallback xmlns="">
       <p:transition spd="slow">
         <p:fade/>
       </p:transition>
@@ -4710,13 +4743,13 @@
   <p:clrMapOvr>
     <a:masterClrMapping/>
   </p:clrMapOvr>
-  <mc:AlternateContent xmlns:mc="http://schemas.openxmlformats.org/markup-compatibility/2006">
-    <mc:Choice xmlns:p14="http://schemas.microsoft.com/office/powerpoint/2010/main" Requires="p14">
+  <mc:AlternateContent xmlns:mc="http://schemas.openxmlformats.org/markup-compatibility/2006" xmlns:p14="http://schemas.microsoft.com/office/powerpoint/2010/main">
+    <mc:Choice Requires="p14">
       <p:transition spd="slow" p14:dur="800">
         <p14:flythrough/>
       </p:transition>
     </mc:Choice>
-    <mc:Fallback>
+    <mc:Fallback xmlns="">
       <p:transition spd="slow">
         <p:fade/>
       </p:transition>
@@ -4813,13 +4846,13 @@
   <p:clrMapOvr>
     <a:masterClrMapping/>
   </p:clrMapOvr>
-  <mc:AlternateContent xmlns:mc="http://schemas.openxmlformats.org/markup-compatibility/2006">
-    <mc:Choice xmlns:p14="http://schemas.microsoft.com/office/powerpoint/2010/main" Requires="p14">
+  <mc:AlternateContent xmlns:mc="http://schemas.openxmlformats.org/markup-compatibility/2006" xmlns:p14="http://schemas.microsoft.com/office/powerpoint/2010/main">
+    <mc:Choice Requires="p14">
       <p:transition spd="slow" p14:dur="800">
         <p14:flythrough/>
       </p:transition>
     </mc:Choice>
-    <mc:Fallback>
+    <mc:Fallback xmlns="">
       <p:transition spd="slow">
         <p:fade/>
       </p:transition>
@@ -4916,13 +4949,13 @@
   <p:clrMapOvr>
     <a:masterClrMapping/>
   </p:clrMapOvr>
-  <mc:AlternateContent xmlns:mc="http://schemas.openxmlformats.org/markup-compatibility/2006">
-    <mc:Choice xmlns:p14="http://schemas.microsoft.com/office/powerpoint/2010/main" Requires="p14">
+  <mc:AlternateContent xmlns:mc="http://schemas.openxmlformats.org/markup-compatibility/2006" xmlns:p14="http://schemas.microsoft.com/office/powerpoint/2010/main">
+    <mc:Choice Requires="p14">
       <p:transition spd="slow" p14:dur="800">
         <p14:flythrough/>
       </p:transition>
     </mc:Choice>
-    <mc:Fallback>
+    <mc:Fallback xmlns="">
       <p:transition spd="slow">
         <p:fade/>
       </p:transition>
@@ -5017,13 +5050,13 @@
   <p:clrMapOvr>
     <a:masterClrMapping/>
   </p:clrMapOvr>
-  <mc:AlternateContent xmlns:mc="http://schemas.openxmlformats.org/markup-compatibility/2006">
-    <mc:Choice xmlns:p14="http://schemas.microsoft.com/office/powerpoint/2010/main" Requires="p14">
+  <mc:AlternateContent xmlns:mc="http://schemas.openxmlformats.org/markup-compatibility/2006" xmlns:p14="http://schemas.microsoft.com/office/powerpoint/2010/main">
+    <mc:Choice Requires="p14">
       <p:transition spd="slow" p14:dur="800">
         <p14:flythrough/>
       </p:transition>
     </mc:Choice>
-    <mc:Fallback>
+    <mc:Fallback xmlns="">
       <p:transition spd="slow">
         <p:fade/>
       </p:transition>
@@ -5118,13 +5151,13 @@
   <p:clrMapOvr>
     <a:masterClrMapping/>
   </p:clrMapOvr>
-  <mc:AlternateContent xmlns:mc="http://schemas.openxmlformats.org/markup-compatibility/2006">
-    <mc:Choice xmlns:p14="http://schemas.microsoft.com/office/powerpoint/2010/main" Requires="p14">
+  <mc:AlternateContent xmlns:mc="http://schemas.openxmlformats.org/markup-compatibility/2006" xmlns:p14="http://schemas.microsoft.com/office/powerpoint/2010/main">
+    <mc:Choice Requires="p14">
       <p:transition spd="slow" p14:dur="800">
         <p14:flythrough/>
       </p:transition>
     </mc:Choice>
-    <mc:Fallback>
+    <mc:Fallback xmlns="">
       <p:transition spd="slow">
         <p:fade/>
       </p:transition>

</xml_diff>

<commit_message>
Indexed member access withdrawn
</commit_message>
<xml_diff>
--- a/The future of C#.pptx
+++ b/The future of C#.pptx
@@ -18,12 +18,11 @@
     <p:sldId id="266" r:id="rId12"/>
     <p:sldId id="267" r:id="rId13"/>
     <p:sldId id="268" r:id="rId14"/>
-    <p:sldId id="275" r:id="rId15"/>
-    <p:sldId id="269" r:id="rId16"/>
-    <p:sldId id="270" r:id="rId17"/>
-    <p:sldId id="271" r:id="rId18"/>
-    <p:sldId id="274" r:id="rId19"/>
-    <p:sldId id="273" r:id="rId20"/>
+    <p:sldId id="269" r:id="rId15"/>
+    <p:sldId id="270" r:id="rId16"/>
+    <p:sldId id="271" r:id="rId17"/>
+    <p:sldId id="274" r:id="rId18"/>
+    <p:sldId id="273" r:id="rId19"/>
   </p:sldIdLst>
   <p:sldSz cx="9144000" cy="6858000" type="screen4x3"/>
   <p:notesSz cx="6858000" cy="9144000"/>
@@ -122,6 +121,22 @@
       </a:defRPr>
     </a:lvl9pPr>
   </p:defaultTextStyle>
+  <p:extLst>
+    <p:ext uri="{EFAFB233-063F-42B5-8137-9DF3F51BA10A}">
+      <p15:sldGuideLst xmlns:p15="http://schemas.microsoft.com/office/powerpoint/2012/main">
+        <p15:guide id="1" orient="horz" pos="2160">
+          <p15:clr>
+            <a:srgbClr val="A4A3A4"/>
+          </p15:clr>
+        </p15:guide>
+        <p15:guide id="2" pos="2880">
+          <p15:clr>
+            <a:srgbClr val="A4A3A4"/>
+          </p15:clr>
+        </p15:guide>
+      </p15:sldGuideLst>
+    </p:ext>
+  </p:extLst>
 </p:presentation>
 </file>
 
@@ -306,7 +321,7 @@
           <a:p>
             <a:fld id="{87FE2091-D384-45CF-9E2A-9C8DD433CB74}" type="datetimeFigureOut">
               <a:rPr lang="en-NZ" smtClean="0"/>
-              <a:t>15/04/2014</a:t>
+              <a:t>10/06/2014</a:t>
             </a:fld>
             <a:endParaRPr lang="en-NZ"/>
           </a:p>
@@ -476,7 +491,7 @@
           <a:p>
             <a:fld id="{87FE2091-D384-45CF-9E2A-9C8DD433CB74}" type="datetimeFigureOut">
               <a:rPr lang="en-NZ" smtClean="0"/>
-              <a:t>15/04/2014</a:t>
+              <a:t>10/06/2014</a:t>
             </a:fld>
             <a:endParaRPr lang="en-NZ"/>
           </a:p>
@@ -656,7 +671,7 @@
           <a:p>
             <a:fld id="{87FE2091-D384-45CF-9E2A-9C8DD433CB74}" type="datetimeFigureOut">
               <a:rPr lang="en-NZ" smtClean="0"/>
-              <a:t>15/04/2014</a:t>
+              <a:t>10/06/2014</a:t>
             </a:fld>
             <a:endParaRPr lang="en-NZ"/>
           </a:p>
@@ -826,7 +841,7 @@
           <a:p>
             <a:fld id="{87FE2091-D384-45CF-9E2A-9C8DD433CB74}" type="datetimeFigureOut">
               <a:rPr lang="en-NZ" smtClean="0"/>
-              <a:t>15/04/2014</a:t>
+              <a:t>10/06/2014</a:t>
             </a:fld>
             <a:endParaRPr lang="en-NZ"/>
           </a:p>
@@ -1072,7 +1087,7 @@
           <a:p>
             <a:fld id="{87FE2091-D384-45CF-9E2A-9C8DD433CB74}" type="datetimeFigureOut">
               <a:rPr lang="en-NZ" smtClean="0"/>
-              <a:t>15/04/2014</a:t>
+              <a:t>10/06/2014</a:t>
             </a:fld>
             <a:endParaRPr lang="en-NZ"/>
           </a:p>
@@ -1360,7 +1375,7 @@
           <a:p>
             <a:fld id="{87FE2091-D384-45CF-9E2A-9C8DD433CB74}" type="datetimeFigureOut">
               <a:rPr lang="en-NZ" smtClean="0"/>
-              <a:t>15/04/2014</a:t>
+              <a:t>10/06/2014</a:t>
             </a:fld>
             <a:endParaRPr lang="en-NZ"/>
           </a:p>
@@ -1782,7 +1797,7 @@
           <a:p>
             <a:fld id="{87FE2091-D384-45CF-9E2A-9C8DD433CB74}" type="datetimeFigureOut">
               <a:rPr lang="en-NZ" smtClean="0"/>
-              <a:t>15/04/2014</a:t>
+              <a:t>10/06/2014</a:t>
             </a:fld>
             <a:endParaRPr lang="en-NZ"/>
           </a:p>
@@ -1900,7 +1915,7 @@
           <a:p>
             <a:fld id="{87FE2091-D384-45CF-9E2A-9C8DD433CB74}" type="datetimeFigureOut">
               <a:rPr lang="en-NZ" smtClean="0"/>
-              <a:t>15/04/2014</a:t>
+              <a:t>10/06/2014</a:t>
             </a:fld>
             <a:endParaRPr lang="en-NZ"/>
           </a:p>
@@ -1995,7 +2010,7 @@
           <a:p>
             <a:fld id="{87FE2091-D384-45CF-9E2A-9C8DD433CB74}" type="datetimeFigureOut">
               <a:rPr lang="en-NZ" smtClean="0"/>
-              <a:t>15/04/2014</a:t>
+              <a:t>10/06/2014</a:t>
             </a:fld>
             <a:endParaRPr lang="en-NZ"/>
           </a:p>
@@ -2272,7 +2287,7 @@
           <a:p>
             <a:fld id="{87FE2091-D384-45CF-9E2A-9C8DD433CB74}" type="datetimeFigureOut">
               <a:rPr lang="en-NZ" smtClean="0"/>
-              <a:t>15/04/2014</a:t>
+              <a:t>10/06/2014</a:t>
             </a:fld>
             <a:endParaRPr lang="en-NZ"/>
           </a:p>
@@ -2525,7 +2540,7 @@
           <a:p>
             <a:fld id="{87FE2091-D384-45CF-9E2A-9C8DD433CB74}" type="datetimeFigureOut">
               <a:rPr lang="en-NZ" smtClean="0"/>
-              <a:t>15/04/2014</a:t>
+              <a:t>10/06/2014</a:t>
             </a:fld>
             <a:endParaRPr lang="en-NZ"/>
           </a:p>
@@ -2738,7 +2753,7 @@
           <a:p>
             <a:fld id="{87FE2091-D384-45CF-9E2A-9C8DD433CB74}" type="datetimeFigureOut">
               <a:rPr lang="en-NZ" smtClean="0"/>
-              <a:t>15/04/2014</a:t>
+              <a:t>10/06/2014</a:t>
             </a:fld>
             <a:endParaRPr lang="en-NZ"/>
           </a:p>
@@ -3658,7 +3673,7 @@
           <a:p>
             <a:r>
               <a:rPr lang="en-NZ" sz="4000" b="1" dirty="0" smtClean="0"/>
-              <a:t>Pseudo-dynamic style</a:t>
+              <a:t>Tidying and fixes</a:t>
             </a:r>
             <a:endParaRPr lang="en-NZ" sz="4000" b="1" dirty="0"/>
           </a:p>
@@ -3700,7 +3715,7 @@
     </p:spTree>
     <p:extLst>
       <p:ext uri="{BB962C8B-B14F-4D97-AF65-F5344CB8AC3E}">
-        <p14:creationId xmlns:p14="http://schemas.microsoft.com/office/powerpoint/2010/main" val="1056115138"/>
+        <p14:creationId xmlns:p14="http://schemas.microsoft.com/office/powerpoint/2010/main" val="2498021043"/>
       </p:ext>
     </p:extLst>
   </p:cSld>
@@ -3765,7 +3780,7 @@
           <a:p>
             <a:r>
               <a:rPr lang="en-NZ" sz="4000" b="1" dirty="0" smtClean="0"/>
-              <a:t>Tidying and fixes</a:t>
+              <a:t>Are you going to mention VB?</a:t>
             </a:r>
             <a:endParaRPr lang="en-NZ" sz="4000" b="1" dirty="0"/>
           </a:p>
@@ -3807,7 +3822,7 @@
     </p:spTree>
     <p:extLst>
       <p:ext uri="{BB962C8B-B14F-4D97-AF65-F5344CB8AC3E}">
-        <p14:creationId xmlns:p14="http://schemas.microsoft.com/office/powerpoint/2010/main" val="2498021043"/>
+        <p14:creationId xmlns:p14="http://schemas.microsoft.com/office/powerpoint/2010/main" val="1599761143"/>
       </p:ext>
     </p:extLst>
   </p:cSld>
@@ -3872,7 +3887,7 @@
           <a:p>
             <a:r>
               <a:rPr lang="en-NZ" sz="4000" b="1" dirty="0" smtClean="0"/>
-              <a:t>Are you going to mention VB?</a:t>
+              <a:t>Roslyn</a:t>
             </a:r>
             <a:endParaRPr lang="en-NZ" sz="4000" b="1" dirty="0"/>
           </a:p>
@@ -3880,41 +3895,38 @@
       </p:sp>
       <p:sp>
         <p:nvSpPr>
-          <p:cNvPr id="3" name="TextBox 2"/>
-          <p:cNvSpPr txBox="1"/>
-          <p:nvPr/>
+          <p:cNvPr id="4" name="Subtitle 2"/>
+          <p:cNvSpPr>
+            <a:spLocks noGrp="1"/>
+          </p:cNvSpPr>
+          <p:nvPr>
+            <p:ph type="subTitle" idx="1"/>
+          </p:nvPr>
         </p:nvSpPr>
         <p:spPr>
           <a:xfrm>
-            <a:off x="1115616" y="6228020"/>
-            <a:ext cx="7776864" cy="369332"/>
+            <a:off x="1371600" y="3886200"/>
+            <a:ext cx="6400800" cy="1752600"/>
           </a:xfrm>
-          <a:prstGeom prst="rect">
-            <a:avLst/>
-          </a:prstGeom>
-          <a:noFill/>
         </p:spPr>
         <p:txBody>
-          <a:bodyPr wrap="square" rtlCol="0">
-            <a:spAutoFit/>
+          <a:bodyPr>
+            <a:normAutofit/>
           </a:bodyPr>
           <a:lstStyle/>
           <a:p>
-            <a:pPr algn="r"/>
-            <a:r>
-              <a:rPr lang="en-NZ" dirty="0" smtClean="0">
-                <a:hlinkClick r:id="rId2"/>
-              </a:rPr>
-              <a:t>http://roslyn.codeplex.com/wikipage?title=Language%20Feature%20Status</a:t>
-            </a:r>
-            <a:endParaRPr lang="en-NZ" dirty="0"/>
+            <a:r>
+              <a:rPr lang="en-NZ" sz="2000" dirty="0" smtClean="0"/>
+              <a:t>also known as the .NET Compiler Platform</a:t>
+            </a:r>
+            <a:endParaRPr lang="en-NZ" sz="2000" dirty="0"/>
           </a:p>
         </p:txBody>
       </p:sp>
     </p:spTree>
     <p:extLst>
       <p:ext uri="{BB962C8B-B14F-4D97-AF65-F5344CB8AC3E}">
-        <p14:creationId xmlns:p14="http://schemas.microsoft.com/office/powerpoint/2010/main" val="1599761143"/>
+        <p14:creationId xmlns:p14="http://schemas.microsoft.com/office/powerpoint/2010/main" val="1806456981"/>
       </p:ext>
     </p:extLst>
   </p:cSld>
@@ -3979,7 +3991,7 @@
           <a:p>
             <a:r>
               <a:rPr lang="en-NZ" sz="4000" b="1" dirty="0" smtClean="0"/>
-              <a:t>Roslyn</a:t>
+              <a:t>…is open</a:t>
             </a:r>
             <a:endParaRPr lang="en-NZ" sz="4000" b="1" dirty="0"/>
           </a:p>
@@ -4009,7 +4021,13 @@
           <a:p>
             <a:r>
               <a:rPr lang="en-NZ" sz="2000" dirty="0" smtClean="0"/>
-              <a:t>also known as the .NET Compiler Platform</a:t>
+              <a:t>also known as</a:t>
+            </a:r>
+          </a:p>
+          <a:p>
+            <a:r>
+              <a:rPr lang="en-NZ" sz="2000" dirty="0" smtClean="0"/>
+              <a:t>“Why I didn’t call this talk ‘What’s new in C# 6’”</a:t>
             </a:r>
             <a:endParaRPr lang="en-NZ" sz="2000" dirty="0"/>
           </a:p>
@@ -4018,7 +4036,7 @@
     </p:spTree>
     <p:extLst>
       <p:ext uri="{BB962C8B-B14F-4D97-AF65-F5344CB8AC3E}">
-        <p14:creationId xmlns:p14="http://schemas.microsoft.com/office/powerpoint/2010/main" val="1806456981"/>
+        <p14:creationId xmlns:p14="http://schemas.microsoft.com/office/powerpoint/2010/main" val="3710276921"/>
       </p:ext>
     </p:extLst>
   </p:cSld>
@@ -4083,7 +4101,7 @@
           <a:p>
             <a:r>
               <a:rPr lang="en-NZ" sz="4000" b="1" dirty="0" smtClean="0"/>
-              <a:t>…is open</a:t>
+              <a:t>Thanks!</a:t>
             </a:r>
             <a:endParaRPr lang="en-NZ" sz="4000" b="1" dirty="0"/>
           </a:p>
@@ -4091,7 +4109,7 @@
       </p:sp>
       <p:sp>
         <p:nvSpPr>
-          <p:cNvPr id="4" name="Subtitle 2"/>
+          <p:cNvPr id="3" name="Subtitle 2"/>
           <p:cNvSpPr>
             <a:spLocks noGrp="1"/>
           </p:cNvSpPr>
@@ -4099,12 +4117,7 @@
             <p:ph type="subTitle" idx="1"/>
           </p:nvPr>
         </p:nvSpPr>
-        <p:spPr>
-          <a:xfrm>
-            <a:off x="1371600" y="3886200"/>
-            <a:ext cx="6400800" cy="1752600"/>
-          </a:xfrm>
-        </p:spPr>
+        <p:spPr/>
         <p:txBody>
           <a:bodyPr>
             <a:normAutofit/>
@@ -4112,23 +4125,127 @@
           <a:lstStyle/>
           <a:p>
             <a:r>
-              <a:rPr lang="en-NZ" sz="2000" dirty="0" smtClean="0"/>
-              <a:t>also known as</a:t>
-            </a:r>
-          </a:p>
-          <a:p>
-            <a:r>
-              <a:rPr lang="en-NZ" sz="2000" dirty="0" smtClean="0"/>
-              <a:t>“Why I didn’t call this talk ‘What’s new in C# 6’”</a:t>
-            </a:r>
-            <a:endParaRPr lang="en-NZ" sz="2000" dirty="0"/>
+              <a:rPr lang="en-NZ" sz="2800" b="1" dirty="0" smtClean="0"/>
+              <a:t>Ivan </a:t>
+            </a:r>
+            <a:r>
+              <a:rPr lang="en-NZ" sz="2800" b="1" dirty="0" err="1" smtClean="0"/>
+              <a:t>Towlson</a:t>
+            </a:r>
+            <a:endParaRPr lang="en-NZ" sz="2800" b="1" dirty="0" smtClean="0"/>
+          </a:p>
+          <a:p>
+            <a:r>
+              <a:rPr lang="en-NZ" sz="2800" b="1" dirty="0" err="1" smtClean="0"/>
+              <a:t>GreenButton</a:t>
+            </a:r>
+            <a:endParaRPr lang="en-NZ" sz="2800" b="1" dirty="0"/>
+          </a:p>
+        </p:txBody>
+      </p:sp>
+      <p:sp>
+        <p:nvSpPr>
+          <p:cNvPr id="4" name="TextBox 3"/>
+          <p:cNvSpPr txBox="1"/>
+          <p:nvPr/>
+        </p:nvSpPr>
+        <p:spPr>
+          <a:xfrm>
+            <a:off x="4067944" y="5746030"/>
+            <a:ext cx="4896544" cy="923330"/>
+          </a:xfrm>
+          <a:prstGeom prst="rect">
+            <a:avLst/>
+          </a:prstGeom>
+          <a:noFill/>
+        </p:spPr>
+        <p:txBody>
+          <a:bodyPr wrap="square" rtlCol="0">
+            <a:spAutoFit/>
+          </a:bodyPr>
+          <a:lstStyle/>
+          <a:p>
+            <a:pPr algn="r"/>
+            <a:r>
+              <a:rPr lang="en-NZ" dirty="0">
+                <a:hlinkClick r:id="rId2"/>
+              </a:rPr>
+              <a:t>https://github.com/itowlson/future-of-csharp</a:t>
+            </a:r>
+            <a:r>
+              <a:rPr lang="en-NZ" dirty="0" smtClean="0">
+                <a:hlinkClick r:id="rId2"/>
+              </a:rPr>
+              <a:t>/</a:t>
+            </a:r>
+          </a:p>
+          <a:p>
+            <a:pPr algn="r"/>
+            <a:r>
+              <a:rPr lang="en-NZ" dirty="0" smtClean="0">
+                <a:hlinkClick r:id="rId2"/>
+              </a:rPr>
+              <a:t>http://developer.greenbutton.com</a:t>
+            </a:r>
+            <a:endParaRPr lang="en-NZ" dirty="0" smtClean="0"/>
+          </a:p>
+          <a:p>
+            <a:pPr algn="r"/>
+            <a:r>
+              <a:rPr lang="en-NZ" dirty="0" smtClean="0">
+                <a:hlinkClick r:id="rId3"/>
+              </a:rPr>
+              <a:t>http://hestia.typepad.com/flatlander</a:t>
+            </a:r>
+            <a:endParaRPr lang="en-NZ" dirty="0" smtClean="0"/>
+          </a:p>
+        </p:txBody>
+      </p:sp>
+      <p:sp>
+        <p:nvSpPr>
+          <p:cNvPr id="5" name="TextBox 4"/>
+          <p:cNvSpPr txBox="1"/>
+          <p:nvPr/>
+        </p:nvSpPr>
+        <p:spPr>
+          <a:xfrm>
+            <a:off x="251520" y="6021288"/>
+            <a:ext cx="4032448" cy="646331"/>
+          </a:xfrm>
+          <a:prstGeom prst="rect">
+            <a:avLst/>
+          </a:prstGeom>
+          <a:noFill/>
+        </p:spPr>
+        <p:txBody>
+          <a:bodyPr wrap="square" rtlCol="0">
+            <a:spAutoFit/>
+          </a:bodyPr>
+          <a:lstStyle/>
+          <a:p>
+            <a:r>
+              <a:rPr lang="en-NZ" dirty="0" smtClean="0">
+                <a:hlinkClick r:id="rId4"/>
+              </a:rPr>
+              <a:t>ivan@greenbutton.com</a:t>
+            </a:r>
+            <a:endParaRPr lang="en-NZ" dirty="0" smtClean="0"/>
+          </a:p>
+          <a:p>
+            <a:r>
+              <a:rPr lang="en-NZ" dirty="0" smtClean="0">
+                <a:hlinkClick r:id="rId5"/>
+              </a:rPr>
+              <a:t>ivan@hestia.cc</a:t>
+            </a:r>
+            <a:endParaRPr lang="en-NZ" dirty="0" smtClean="0"/>
           </a:p>
         </p:txBody>
       </p:sp>
     </p:spTree>
     <p:extLst>
       <p:ext uri="{BB962C8B-B14F-4D97-AF65-F5344CB8AC3E}">
-        <p14:creationId xmlns:p14="http://schemas.microsoft.com/office/powerpoint/2010/main" val="3710276921"/>
+        <p14:creationId xmlns:p14="http://schemas.microsoft.com/office/powerpoint/2010/main" val="2147454668"/>
       </p:ext>
     </p:extLst>
   </p:cSld>
@@ -4142,221 +4259,6 @@
       </p:transition>
     </mc:Choice>
     <mc:Fallback xmlns="">
-      <p:transition spd="med">
-        <p:fade/>
-      </p:transition>
-    </mc:Fallback>
-  </mc:AlternateContent>
-  <p:timing>
-    <p:tnLst>
-      <p:par>
-        <p:cTn id="1" dur="indefinite" restart="never" nodeType="tmRoot"/>
-      </p:par>
-    </p:tnLst>
-  </p:timing>
-</p:sld>
-</file>
-
-<file path=ppt/slides/slide19.xml><?xml version="1.0" encoding="utf-8"?>
-<p:sld xmlns:a="http://schemas.openxmlformats.org/drawingml/2006/main" xmlns:r="http://schemas.openxmlformats.org/officeDocument/2006/relationships" xmlns:p="http://schemas.openxmlformats.org/presentationml/2006/main">
-  <p:cSld>
-    <p:spTree>
-      <p:nvGrpSpPr>
-        <p:cNvPr id="1" name=""/>
-        <p:cNvGrpSpPr/>
-        <p:nvPr/>
-      </p:nvGrpSpPr>
-      <p:grpSpPr>
-        <a:xfrm>
-          <a:off x="0" y="0"/>
-          <a:ext cx="0" cy="0"/>
-          <a:chOff x="0" y="0"/>
-          <a:chExt cx="0" cy="0"/>
-        </a:xfrm>
-      </p:grpSpPr>
-      <p:sp>
-        <p:nvSpPr>
-          <p:cNvPr id="2" name="Title 1"/>
-          <p:cNvSpPr>
-            <a:spLocks noGrp="1"/>
-          </p:cNvSpPr>
-          <p:nvPr>
-            <p:ph type="ctrTitle"/>
-          </p:nvPr>
-        </p:nvSpPr>
-        <p:spPr/>
-        <p:txBody>
-          <a:bodyPr>
-            <a:normAutofit/>
-          </a:bodyPr>
-          <a:lstStyle/>
-          <a:p>
-            <a:r>
-              <a:rPr lang="en-NZ" sz="4000" b="1" dirty="0" smtClean="0"/>
-              <a:t>Thanks!</a:t>
-            </a:r>
-            <a:endParaRPr lang="en-NZ" sz="4000" b="1" dirty="0"/>
-          </a:p>
-        </p:txBody>
-      </p:sp>
-      <p:sp>
-        <p:nvSpPr>
-          <p:cNvPr id="3" name="Subtitle 2"/>
-          <p:cNvSpPr>
-            <a:spLocks noGrp="1"/>
-          </p:cNvSpPr>
-          <p:nvPr>
-            <p:ph type="subTitle" idx="1"/>
-          </p:nvPr>
-        </p:nvSpPr>
-        <p:spPr/>
-        <p:txBody>
-          <a:bodyPr>
-            <a:normAutofit/>
-          </a:bodyPr>
-          <a:lstStyle/>
-          <a:p>
-            <a:r>
-              <a:rPr lang="en-NZ" sz="2800" b="1" dirty="0" smtClean="0"/>
-              <a:t>Ivan </a:t>
-            </a:r>
-            <a:r>
-              <a:rPr lang="en-NZ" sz="2800" b="1" dirty="0" err="1" smtClean="0"/>
-              <a:t>Towlson</a:t>
-            </a:r>
-            <a:endParaRPr lang="en-NZ" sz="2800" b="1" dirty="0" smtClean="0"/>
-          </a:p>
-          <a:p>
-            <a:r>
-              <a:rPr lang="en-NZ" sz="2800" b="1" dirty="0" err="1" smtClean="0"/>
-              <a:t>GreenButton</a:t>
-            </a:r>
-            <a:endParaRPr lang="en-NZ" sz="2800" b="1" dirty="0"/>
-          </a:p>
-        </p:txBody>
-      </p:sp>
-      <p:sp>
-        <p:nvSpPr>
-          <p:cNvPr id="4" name="TextBox 3"/>
-          <p:cNvSpPr txBox="1"/>
-          <p:nvPr/>
-        </p:nvSpPr>
-        <p:spPr>
-          <a:xfrm>
-            <a:off x="4067944" y="5746030"/>
-            <a:ext cx="4896544" cy="923330"/>
-          </a:xfrm>
-          <a:prstGeom prst="rect">
-            <a:avLst/>
-          </a:prstGeom>
-          <a:noFill/>
-        </p:spPr>
-        <p:txBody>
-          <a:bodyPr wrap="square" rtlCol="0">
-            <a:spAutoFit/>
-          </a:bodyPr>
-          <a:lstStyle/>
-          <a:p>
-            <a:pPr algn="r"/>
-            <a:r>
-              <a:rPr lang="en-NZ" dirty="0">
-                <a:hlinkClick r:id="rId2"/>
-              </a:rPr>
-              <a:t>https://github.com/itowlson/future-of-csharp</a:t>
-            </a:r>
-            <a:r>
-              <a:rPr lang="en-NZ" dirty="0" smtClean="0">
-                <a:hlinkClick r:id="rId2"/>
-              </a:rPr>
-              <a:t>/</a:t>
-            </a:r>
-          </a:p>
-          <a:p>
-            <a:pPr algn="r"/>
-            <a:r>
-              <a:rPr lang="en-NZ" dirty="0" smtClean="0">
-                <a:hlinkClick r:id="rId2"/>
-              </a:rPr>
-              <a:t>http</a:t>
-            </a:r>
-            <a:r>
-              <a:rPr lang="en-NZ" dirty="0" smtClean="0">
-                <a:hlinkClick r:id="rId2"/>
-              </a:rPr>
-              <a:t>://developer.greenbutton.com</a:t>
-            </a:r>
-            <a:endParaRPr lang="en-NZ" dirty="0" smtClean="0"/>
-          </a:p>
-          <a:p>
-            <a:pPr algn="r"/>
-            <a:r>
-              <a:rPr lang="en-NZ" dirty="0" smtClean="0">
-                <a:hlinkClick r:id="rId3"/>
-              </a:rPr>
-              <a:t>http://hestia.typepad.com/flatlander</a:t>
-            </a:r>
-            <a:endParaRPr lang="en-NZ" dirty="0" smtClean="0"/>
-          </a:p>
-        </p:txBody>
-      </p:sp>
-      <p:sp>
-        <p:nvSpPr>
-          <p:cNvPr id="5" name="TextBox 4"/>
-          <p:cNvSpPr txBox="1"/>
-          <p:nvPr/>
-        </p:nvSpPr>
-        <p:spPr>
-          <a:xfrm>
-            <a:off x="251520" y="6021288"/>
-            <a:ext cx="4032448" cy="646331"/>
-          </a:xfrm>
-          <a:prstGeom prst="rect">
-            <a:avLst/>
-          </a:prstGeom>
-          <a:noFill/>
-        </p:spPr>
-        <p:txBody>
-          <a:bodyPr wrap="square" rtlCol="0">
-            <a:spAutoFit/>
-          </a:bodyPr>
-          <a:lstStyle/>
-          <a:p>
-            <a:r>
-              <a:rPr lang="en-NZ" dirty="0" smtClean="0">
-                <a:hlinkClick r:id="rId4"/>
-              </a:rPr>
-              <a:t>ivan@greenbutton.com</a:t>
-            </a:r>
-            <a:endParaRPr lang="en-NZ" dirty="0" smtClean="0"/>
-          </a:p>
-          <a:p>
-            <a:r>
-              <a:rPr lang="en-NZ" dirty="0" smtClean="0">
-                <a:hlinkClick r:id="rId5"/>
-              </a:rPr>
-              <a:t>ivan@hestia.cc</a:t>
-            </a:r>
-            <a:endParaRPr lang="en-NZ" dirty="0" smtClean="0"/>
-          </a:p>
-        </p:txBody>
-      </p:sp>
-    </p:spTree>
-    <p:extLst>
-      <p:ext uri="{BB962C8B-B14F-4D97-AF65-F5344CB8AC3E}">
-        <p14:creationId xmlns:p14="http://schemas.microsoft.com/office/powerpoint/2010/main" val="2147454668"/>
-      </p:ext>
-    </p:extLst>
-  </p:cSld>
-  <p:clrMapOvr>
-    <a:masterClrMapping/>
-  </p:clrMapOvr>
-  <mc:AlternateContent xmlns:mc="http://schemas.openxmlformats.org/markup-compatibility/2006">
-    <mc:Choice xmlns:p14="http://schemas.microsoft.com/office/powerpoint/2010/main" Requires="p14">
-      <p:transition spd="med" p14:dur="700">
-        <p:fade/>
-      </p:transition>
-    </mc:Choice>
-    <mc:Fallback>
       <p:transition spd="med">
         <p:fade/>
       </p:transition>

</xml_diff>